<commit_message>
update final plots for submission
</commit_message>
<xml_diff>
--- a/plots/Abundance_combined.pptx
+++ b/plots/Abundance_combined.pptx
@@ -243,7 +243,7 @@
           <a:p>
             <a:fld id="{2650D653-7713-C643-991F-EBBA140D9C6E}" type="datetimeFigureOut">
               <a:rPr lang="en-US" smtClean="0"/>
-              <a:t>3/31/23</a:t>
+              <a:t>6/23/23</a:t>
             </a:fld>
             <a:endParaRPr lang="en-US"/>
           </a:p>
@@ -413,7 +413,7 @@
           <a:p>
             <a:fld id="{2650D653-7713-C643-991F-EBBA140D9C6E}" type="datetimeFigureOut">
               <a:rPr lang="en-US" smtClean="0"/>
-              <a:t>3/31/23</a:t>
+              <a:t>6/23/23</a:t>
             </a:fld>
             <a:endParaRPr lang="en-US"/>
           </a:p>
@@ -593,7 +593,7 @@
           <a:p>
             <a:fld id="{2650D653-7713-C643-991F-EBBA140D9C6E}" type="datetimeFigureOut">
               <a:rPr lang="en-US" smtClean="0"/>
-              <a:t>3/31/23</a:t>
+              <a:t>6/23/23</a:t>
             </a:fld>
             <a:endParaRPr lang="en-US"/>
           </a:p>
@@ -763,7 +763,7 @@
           <a:p>
             <a:fld id="{2650D653-7713-C643-991F-EBBA140D9C6E}" type="datetimeFigureOut">
               <a:rPr lang="en-US" smtClean="0"/>
-              <a:t>3/31/23</a:t>
+              <a:t>6/23/23</a:t>
             </a:fld>
             <a:endParaRPr lang="en-US"/>
           </a:p>
@@ -1007,7 +1007,7 @@
           <a:p>
             <a:fld id="{2650D653-7713-C643-991F-EBBA140D9C6E}" type="datetimeFigureOut">
               <a:rPr lang="en-US" smtClean="0"/>
-              <a:t>3/31/23</a:t>
+              <a:t>6/23/23</a:t>
             </a:fld>
             <a:endParaRPr lang="en-US"/>
           </a:p>
@@ -1239,7 +1239,7 @@
           <a:p>
             <a:fld id="{2650D653-7713-C643-991F-EBBA140D9C6E}" type="datetimeFigureOut">
               <a:rPr lang="en-US" smtClean="0"/>
-              <a:t>3/31/23</a:t>
+              <a:t>6/23/23</a:t>
             </a:fld>
             <a:endParaRPr lang="en-US"/>
           </a:p>
@@ -1606,7 +1606,7 @@
           <a:p>
             <a:fld id="{2650D653-7713-C643-991F-EBBA140D9C6E}" type="datetimeFigureOut">
               <a:rPr lang="en-US" smtClean="0"/>
-              <a:t>3/31/23</a:t>
+              <a:t>6/23/23</a:t>
             </a:fld>
             <a:endParaRPr lang="en-US"/>
           </a:p>
@@ -1724,7 +1724,7 @@
           <a:p>
             <a:fld id="{2650D653-7713-C643-991F-EBBA140D9C6E}" type="datetimeFigureOut">
               <a:rPr lang="en-US" smtClean="0"/>
-              <a:t>3/31/23</a:t>
+              <a:t>6/23/23</a:t>
             </a:fld>
             <a:endParaRPr lang="en-US"/>
           </a:p>
@@ -1819,7 +1819,7 @@
           <a:p>
             <a:fld id="{2650D653-7713-C643-991F-EBBA140D9C6E}" type="datetimeFigureOut">
               <a:rPr lang="en-US" smtClean="0"/>
-              <a:t>3/31/23</a:t>
+              <a:t>6/23/23</a:t>
             </a:fld>
             <a:endParaRPr lang="en-US"/>
           </a:p>
@@ -2096,7 +2096,7 @@
           <a:p>
             <a:fld id="{2650D653-7713-C643-991F-EBBA140D9C6E}" type="datetimeFigureOut">
               <a:rPr lang="en-US" smtClean="0"/>
-              <a:t>3/31/23</a:t>
+              <a:t>6/23/23</a:t>
             </a:fld>
             <a:endParaRPr lang="en-US"/>
           </a:p>
@@ -2353,7 +2353,7 @@
           <a:p>
             <a:fld id="{2650D653-7713-C643-991F-EBBA140D9C6E}" type="datetimeFigureOut">
               <a:rPr lang="en-US" smtClean="0"/>
-              <a:t>3/31/23</a:t>
+              <a:t>6/23/23</a:t>
             </a:fld>
             <a:endParaRPr lang="en-US"/>
           </a:p>
@@ -2566,7 +2566,7 @@
           <a:p>
             <a:fld id="{2650D653-7713-C643-991F-EBBA140D9C6E}" type="datetimeFigureOut">
               <a:rPr lang="en-US" smtClean="0"/>
-              <a:t>3/31/23</a:t>
+              <a:t>6/23/23</a:t>
             </a:fld>
             <a:endParaRPr lang="en-US"/>
           </a:p>
@@ -3015,14 +3015,14 @@
           <p:nvPr/>
         </p:nvPicPr>
         <p:blipFill>
-          <a:blip r:embed="rId2"/>
+          <a:blip r:embed="rId3"/>
           <a:srcRect/>
           <a:stretch/>
         </p:blipFill>
         <p:spPr>
           <a:xfrm>
             <a:off x="-115688" y="4330654"/>
-            <a:ext cx="5470211" cy="3646807"/>
+            <a:ext cx="5470210" cy="3646807"/>
           </a:xfrm>
           <a:prstGeom prst="rect">
             <a:avLst/>
@@ -3044,7 +3044,7 @@
           <p:nvPr/>
         </p:nvPicPr>
         <p:blipFill>
-          <a:blip r:embed="rId3"/>
+          <a:blip r:embed="rId4"/>
           <a:srcRect t="4188" b="4188"/>
           <a:stretch/>
         </p:blipFill>
@@ -3119,7 +3119,7 @@
           <p:nvPr/>
         </p:nvPicPr>
         <p:blipFill>
-          <a:blip r:embed="rId4"/>
+          <a:blip r:embed="rId5"/>
           <a:stretch>
             <a:fillRect/>
           </a:stretch>

</xml_diff>

<commit_message>
update figure text and markdown before BioScience submission
</commit_message>
<xml_diff>
--- a/plots/Abundance_combined.pptx
+++ b/plots/Abundance_combined.pptx
@@ -243,7 +243,7 @@
           <a:p>
             <a:fld id="{2650D653-7713-C643-991F-EBBA140D9C6E}" type="datetimeFigureOut">
               <a:rPr lang="en-US" smtClean="0"/>
-              <a:t>6/23/23</a:t>
+              <a:t>6/26/23</a:t>
             </a:fld>
             <a:endParaRPr lang="en-US"/>
           </a:p>
@@ -413,7 +413,7 @@
           <a:p>
             <a:fld id="{2650D653-7713-C643-991F-EBBA140D9C6E}" type="datetimeFigureOut">
               <a:rPr lang="en-US" smtClean="0"/>
-              <a:t>6/23/23</a:t>
+              <a:t>6/26/23</a:t>
             </a:fld>
             <a:endParaRPr lang="en-US"/>
           </a:p>
@@ -593,7 +593,7 @@
           <a:p>
             <a:fld id="{2650D653-7713-C643-991F-EBBA140D9C6E}" type="datetimeFigureOut">
               <a:rPr lang="en-US" smtClean="0"/>
-              <a:t>6/23/23</a:t>
+              <a:t>6/26/23</a:t>
             </a:fld>
             <a:endParaRPr lang="en-US"/>
           </a:p>
@@ -763,7 +763,7 @@
           <a:p>
             <a:fld id="{2650D653-7713-C643-991F-EBBA140D9C6E}" type="datetimeFigureOut">
               <a:rPr lang="en-US" smtClean="0"/>
-              <a:t>6/23/23</a:t>
+              <a:t>6/26/23</a:t>
             </a:fld>
             <a:endParaRPr lang="en-US"/>
           </a:p>
@@ -1007,7 +1007,7 @@
           <a:p>
             <a:fld id="{2650D653-7713-C643-991F-EBBA140D9C6E}" type="datetimeFigureOut">
               <a:rPr lang="en-US" smtClean="0"/>
-              <a:t>6/23/23</a:t>
+              <a:t>6/26/23</a:t>
             </a:fld>
             <a:endParaRPr lang="en-US"/>
           </a:p>
@@ -1239,7 +1239,7 @@
           <a:p>
             <a:fld id="{2650D653-7713-C643-991F-EBBA140D9C6E}" type="datetimeFigureOut">
               <a:rPr lang="en-US" smtClean="0"/>
-              <a:t>6/23/23</a:t>
+              <a:t>6/26/23</a:t>
             </a:fld>
             <a:endParaRPr lang="en-US"/>
           </a:p>
@@ -1606,7 +1606,7 @@
           <a:p>
             <a:fld id="{2650D653-7713-C643-991F-EBBA140D9C6E}" type="datetimeFigureOut">
               <a:rPr lang="en-US" smtClean="0"/>
-              <a:t>6/23/23</a:t>
+              <a:t>6/26/23</a:t>
             </a:fld>
             <a:endParaRPr lang="en-US"/>
           </a:p>
@@ -1724,7 +1724,7 @@
           <a:p>
             <a:fld id="{2650D653-7713-C643-991F-EBBA140D9C6E}" type="datetimeFigureOut">
               <a:rPr lang="en-US" smtClean="0"/>
-              <a:t>6/23/23</a:t>
+              <a:t>6/26/23</a:t>
             </a:fld>
             <a:endParaRPr lang="en-US"/>
           </a:p>
@@ -1819,7 +1819,7 @@
           <a:p>
             <a:fld id="{2650D653-7713-C643-991F-EBBA140D9C6E}" type="datetimeFigureOut">
               <a:rPr lang="en-US" smtClean="0"/>
-              <a:t>6/23/23</a:t>
+              <a:t>6/26/23</a:t>
             </a:fld>
             <a:endParaRPr lang="en-US"/>
           </a:p>
@@ -2096,7 +2096,7 @@
           <a:p>
             <a:fld id="{2650D653-7713-C643-991F-EBBA140D9C6E}" type="datetimeFigureOut">
               <a:rPr lang="en-US" smtClean="0"/>
-              <a:t>6/23/23</a:t>
+              <a:t>6/26/23</a:t>
             </a:fld>
             <a:endParaRPr lang="en-US"/>
           </a:p>
@@ -2353,7 +2353,7 @@
           <a:p>
             <a:fld id="{2650D653-7713-C643-991F-EBBA140D9C6E}" type="datetimeFigureOut">
               <a:rPr lang="en-US" smtClean="0"/>
-              <a:t>6/23/23</a:t>
+              <a:t>6/26/23</a:t>
             </a:fld>
             <a:endParaRPr lang="en-US"/>
           </a:p>
@@ -2566,7 +2566,7 @@
           <a:p>
             <a:fld id="{2650D653-7713-C643-991F-EBBA140D9C6E}" type="datetimeFigureOut">
               <a:rPr lang="en-US" smtClean="0"/>
-              <a:t>6/23/23</a:t>
+              <a:t>6/26/23</a:t>
             </a:fld>
             <a:endParaRPr lang="en-US"/>
           </a:p>
@@ -3022,7 +3022,7 @@
         <p:spPr>
           <a:xfrm>
             <a:off x="-115688" y="4330654"/>
-            <a:ext cx="5470210" cy="3646807"/>
+            <a:ext cx="5470210" cy="3646806"/>
           </a:xfrm>
           <a:prstGeom prst="rect">
             <a:avLst/>
@@ -3504,7 +3504,7 @@
                 </a:solidFill>
                 <a:latin typeface="Abadi MT Condensed Light" panose="020B0306030101010103" pitchFamily="34" charset="77"/>
               </a:rPr>
-              <a:t>p = pen</a:t>
+              <a:t>p = penning</a:t>
             </a:r>
           </a:p>
           <a:p>

</xml_diff>

<commit_message>
update to 2023 data workflow
</commit_message>
<xml_diff>
--- a/plots/Abundance_combined.pptx
+++ b/plots/Abundance_combined.pptx
@@ -243,7 +243,7 @@
           <a:p>
             <a:fld id="{2650D653-7713-C643-991F-EBBA140D9C6E}" type="datetimeFigureOut">
               <a:rPr lang="en-US" smtClean="0"/>
-              <a:t>6/26/23</a:t>
+              <a:t>10/5/23</a:t>
             </a:fld>
             <a:endParaRPr lang="en-US"/>
           </a:p>
@@ -413,7 +413,7 @@
           <a:p>
             <a:fld id="{2650D653-7713-C643-991F-EBBA140D9C6E}" type="datetimeFigureOut">
               <a:rPr lang="en-US" smtClean="0"/>
-              <a:t>6/26/23</a:t>
+              <a:t>10/5/23</a:t>
             </a:fld>
             <a:endParaRPr lang="en-US"/>
           </a:p>
@@ -593,7 +593,7 @@
           <a:p>
             <a:fld id="{2650D653-7713-C643-991F-EBBA140D9C6E}" type="datetimeFigureOut">
               <a:rPr lang="en-US" smtClean="0"/>
-              <a:t>6/26/23</a:t>
+              <a:t>10/5/23</a:t>
             </a:fld>
             <a:endParaRPr lang="en-US"/>
           </a:p>
@@ -763,7 +763,7 @@
           <a:p>
             <a:fld id="{2650D653-7713-C643-991F-EBBA140D9C6E}" type="datetimeFigureOut">
               <a:rPr lang="en-US" smtClean="0"/>
-              <a:t>6/26/23</a:t>
+              <a:t>10/5/23</a:t>
             </a:fld>
             <a:endParaRPr lang="en-US"/>
           </a:p>
@@ -1007,7 +1007,7 @@
           <a:p>
             <a:fld id="{2650D653-7713-C643-991F-EBBA140D9C6E}" type="datetimeFigureOut">
               <a:rPr lang="en-US" smtClean="0"/>
-              <a:t>6/26/23</a:t>
+              <a:t>10/5/23</a:t>
             </a:fld>
             <a:endParaRPr lang="en-US"/>
           </a:p>
@@ -1239,7 +1239,7 @@
           <a:p>
             <a:fld id="{2650D653-7713-C643-991F-EBBA140D9C6E}" type="datetimeFigureOut">
               <a:rPr lang="en-US" smtClean="0"/>
-              <a:t>6/26/23</a:t>
+              <a:t>10/5/23</a:t>
             </a:fld>
             <a:endParaRPr lang="en-US"/>
           </a:p>
@@ -1606,7 +1606,7 @@
           <a:p>
             <a:fld id="{2650D653-7713-C643-991F-EBBA140D9C6E}" type="datetimeFigureOut">
               <a:rPr lang="en-US" smtClean="0"/>
-              <a:t>6/26/23</a:t>
+              <a:t>10/5/23</a:t>
             </a:fld>
             <a:endParaRPr lang="en-US"/>
           </a:p>
@@ -1724,7 +1724,7 @@
           <a:p>
             <a:fld id="{2650D653-7713-C643-991F-EBBA140D9C6E}" type="datetimeFigureOut">
               <a:rPr lang="en-US" smtClean="0"/>
-              <a:t>6/26/23</a:t>
+              <a:t>10/5/23</a:t>
             </a:fld>
             <a:endParaRPr lang="en-US"/>
           </a:p>
@@ -1819,7 +1819,7 @@
           <a:p>
             <a:fld id="{2650D653-7713-C643-991F-EBBA140D9C6E}" type="datetimeFigureOut">
               <a:rPr lang="en-US" smtClean="0"/>
-              <a:t>6/26/23</a:t>
+              <a:t>10/5/23</a:t>
             </a:fld>
             <a:endParaRPr lang="en-US"/>
           </a:p>
@@ -2096,7 +2096,7 @@
           <a:p>
             <a:fld id="{2650D653-7713-C643-991F-EBBA140D9C6E}" type="datetimeFigureOut">
               <a:rPr lang="en-US" smtClean="0"/>
-              <a:t>6/26/23</a:t>
+              <a:t>10/5/23</a:t>
             </a:fld>
             <a:endParaRPr lang="en-US"/>
           </a:p>
@@ -2353,7 +2353,7 @@
           <a:p>
             <a:fld id="{2650D653-7713-C643-991F-EBBA140D9C6E}" type="datetimeFigureOut">
               <a:rPr lang="en-US" smtClean="0"/>
-              <a:t>6/26/23</a:t>
+              <a:t>10/5/23</a:t>
             </a:fld>
             <a:endParaRPr lang="en-US"/>
           </a:p>
@@ -2566,7 +2566,7 @@
           <a:p>
             <a:fld id="{2650D653-7713-C643-991F-EBBA140D9C6E}" type="datetimeFigureOut">
               <a:rPr lang="en-US" smtClean="0"/>
-              <a:t>6/26/23</a:t>
+              <a:t>10/5/23</a:t>
             </a:fld>
             <a:endParaRPr lang="en-US"/>
           </a:p>
@@ -3022,7 +3022,7 @@
         <p:spPr>
           <a:xfrm>
             <a:off x="-115688" y="4330654"/>
-            <a:ext cx="5470210" cy="3646806"/>
+            <a:ext cx="5470209" cy="3646806"/>
           </a:xfrm>
           <a:prstGeom prst="rect">
             <a:avLst/>
@@ -3431,8 +3431,8 @@
         </p:nvSpPr>
         <p:spPr>
           <a:xfrm>
-            <a:off x="7922393" y="5937587"/>
-            <a:ext cx="1077145" cy="1449820"/>
+            <a:off x="7840370" y="5937587"/>
+            <a:ext cx="1077145" cy="1505990"/>
           </a:xfrm>
           <a:prstGeom prst="rect">
             <a:avLst/>
@@ -3454,7 +3454,7 @@
           </a:p>
           <a:p>
             <a:r>
-              <a:rPr lang="en-CA" sz="839" dirty="0">
+              <a:rPr lang="en-CA" sz="900" dirty="0">
                 <a:solidFill>
                   <a:srgbClr val="000000"/>
                 </a:solidFill>
@@ -3465,7 +3465,7 @@
           </a:p>
           <a:p>
             <a:r>
-              <a:rPr lang="en-CA" sz="839" dirty="0">
+              <a:rPr lang="en-CA" sz="900" dirty="0">
                 <a:solidFill>
                   <a:srgbClr val="000000"/>
                 </a:solidFill>
@@ -3476,7 +3476,7 @@
           </a:p>
           <a:p>
             <a:r>
-              <a:rPr lang="en-CA" sz="839" dirty="0">
+              <a:rPr lang="en-CA" sz="900" dirty="0">
                 <a:solidFill>
                   <a:srgbClr val="000000"/>
                 </a:solidFill>
@@ -3487,7 +3487,7 @@
           </a:p>
           <a:p>
             <a:r>
-              <a:rPr lang="en-CA" sz="839" dirty="0">
+              <a:rPr lang="en-CA" sz="900" dirty="0">
                 <a:solidFill>
                   <a:srgbClr val="000000"/>
                 </a:solidFill>
@@ -3498,7 +3498,7 @@
           </a:p>
           <a:p>
             <a:r>
-              <a:rPr lang="en-CA" sz="839" dirty="0">
+              <a:rPr lang="en-CA" sz="900" dirty="0">
                 <a:solidFill>
                   <a:srgbClr val="000000"/>
                 </a:solidFill>
@@ -3509,7 +3509,7 @@
           </a:p>
           <a:p>
             <a:r>
-              <a:rPr lang="en-CA" sz="839" dirty="0">
+              <a:rPr lang="en-CA" sz="900" dirty="0">
                 <a:solidFill>
                   <a:srgbClr val="000000"/>
                 </a:solidFill>
@@ -3517,7 +3517,7 @@
               </a:rPr>
               <a:t>f = feeding</a:t>
             </a:r>
-            <a:endParaRPr lang="en-US" sz="839" i="1" dirty="0">
+            <a:endParaRPr lang="en-US" sz="900" i="1" dirty="0">
               <a:latin typeface="Abadi MT Condensed Light" panose="020B0306030101010103" pitchFamily="34" charset="77"/>
             </a:endParaRPr>
           </a:p>

</xml_diff>

<commit_message>
add missed Nakusp penning treatment and Groundhog moose. Start of N more flexible, not constrained so tightly.
</commit_message>
<xml_diff>
--- a/plots/Abundance_combined.pptx
+++ b/plots/Abundance_combined.pptx
@@ -243,7 +243,7 @@
           <a:p>
             <a:fld id="{2650D653-7713-C643-991F-EBBA140D9C6E}" type="datetimeFigureOut">
               <a:rPr lang="en-US" smtClean="0"/>
-              <a:t>10/5/23</a:t>
+              <a:t>12/18/23</a:t>
             </a:fld>
             <a:endParaRPr lang="en-US"/>
           </a:p>
@@ -413,7 +413,7 @@
           <a:p>
             <a:fld id="{2650D653-7713-C643-991F-EBBA140D9C6E}" type="datetimeFigureOut">
               <a:rPr lang="en-US" smtClean="0"/>
-              <a:t>10/5/23</a:t>
+              <a:t>12/18/23</a:t>
             </a:fld>
             <a:endParaRPr lang="en-US"/>
           </a:p>
@@ -593,7 +593,7 @@
           <a:p>
             <a:fld id="{2650D653-7713-C643-991F-EBBA140D9C6E}" type="datetimeFigureOut">
               <a:rPr lang="en-US" smtClean="0"/>
-              <a:t>10/5/23</a:t>
+              <a:t>12/18/23</a:t>
             </a:fld>
             <a:endParaRPr lang="en-US"/>
           </a:p>
@@ -763,7 +763,7 @@
           <a:p>
             <a:fld id="{2650D653-7713-C643-991F-EBBA140D9C6E}" type="datetimeFigureOut">
               <a:rPr lang="en-US" smtClean="0"/>
-              <a:t>10/5/23</a:t>
+              <a:t>12/18/23</a:t>
             </a:fld>
             <a:endParaRPr lang="en-US"/>
           </a:p>
@@ -1007,7 +1007,7 @@
           <a:p>
             <a:fld id="{2650D653-7713-C643-991F-EBBA140D9C6E}" type="datetimeFigureOut">
               <a:rPr lang="en-US" smtClean="0"/>
-              <a:t>10/5/23</a:t>
+              <a:t>12/18/23</a:t>
             </a:fld>
             <a:endParaRPr lang="en-US"/>
           </a:p>
@@ -1239,7 +1239,7 @@
           <a:p>
             <a:fld id="{2650D653-7713-C643-991F-EBBA140D9C6E}" type="datetimeFigureOut">
               <a:rPr lang="en-US" smtClean="0"/>
-              <a:t>10/5/23</a:t>
+              <a:t>12/18/23</a:t>
             </a:fld>
             <a:endParaRPr lang="en-US"/>
           </a:p>
@@ -1606,7 +1606,7 @@
           <a:p>
             <a:fld id="{2650D653-7713-C643-991F-EBBA140D9C6E}" type="datetimeFigureOut">
               <a:rPr lang="en-US" smtClean="0"/>
-              <a:t>10/5/23</a:t>
+              <a:t>12/18/23</a:t>
             </a:fld>
             <a:endParaRPr lang="en-US"/>
           </a:p>
@@ -1724,7 +1724,7 @@
           <a:p>
             <a:fld id="{2650D653-7713-C643-991F-EBBA140D9C6E}" type="datetimeFigureOut">
               <a:rPr lang="en-US" smtClean="0"/>
-              <a:t>10/5/23</a:t>
+              <a:t>12/18/23</a:t>
             </a:fld>
             <a:endParaRPr lang="en-US"/>
           </a:p>
@@ -1819,7 +1819,7 @@
           <a:p>
             <a:fld id="{2650D653-7713-C643-991F-EBBA140D9C6E}" type="datetimeFigureOut">
               <a:rPr lang="en-US" smtClean="0"/>
-              <a:t>10/5/23</a:t>
+              <a:t>12/18/23</a:t>
             </a:fld>
             <a:endParaRPr lang="en-US"/>
           </a:p>
@@ -2096,7 +2096,7 @@
           <a:p>
             <a:fld id="{2650D653-7713-C643-991F-EBBA140D9C6E}" type="datetimeFigureOut">
               <a:rPr lang="en-US" smtClean="0"/>
-              <a:t>10/5/23</a:t>
+              <a:t>12/18/23</a:t>
             </a:fld>
             <a:endParaRPr lang="en-US"/>
           </a:p>
@@ -2353,7 +2353,7 @@
           <a:p>
             <a:fld id="{2650D653-7713-C643-991F-EBBA140D9C6E}" type="datetimeFigureOut">
               <a:rPr lang="en-US" smtClean="0"/>
-              <a:t>10/5/23</a:t>
+              <a:t>12/18/23</a:t>
             </a:fld>
             <a:endParaRPr lang="en-US"/>
           </a:p>
@@ -2566,7 +2566,7 @@
           <a:p>
             <a:fld id="{2650D653-7713-C643-991F-EBBA140D9C6E}" type="datetimeFigureOut">
               <a:rPr lang="en-US" smtClean="0"/>
-              <a:t>10/5/23</a:t>
+              <a:t>12/18/23</a:t>
             </a:fld>
             <a:endParaRPr lang="en-US"/>
           </a:p>

</xml_diff>

<commit_message>
update ReadMe's and final runs
</commit_message>
<xml_diff>
--- a/plots/Abundance_combined.pptx
+++ b/plots/Abundance_combined.pptx
@@ -243,7 +243,7 @@
           <a:p>
             <a:fld id="{2650D653-7713-C643-991F-EBBA140D9C6E}" type="datetimeFigureOut">
               <a:rPr lang="en-US" smtClean="0"/>
-              <a:t>12/18/23</a:t>
+              <a:t>12/22/23</a:t>
             </a:fld>
             <a:endParaRPr lang="en-US"/>
           </a:p>
@@ -413,7 +413,7 @@
           <a:p>
             <a:fld id="{2650D653-7713-C643-991F-EBBA140D9C6E}" type="datetimeFigureOut">
               <a:rPr lang="en-US" smtClean="0"/>
-              <a:t>12/18/23</a:t>
+              <a:t>12/22/23</a:t>
             </a:fld>
             <a:endParaRPr lang="en-US"/>
           </a:p>
@@ -593,7 +593,7 @@
           <a:p>
             <a:fld id="{2650D653-7713-C643-991F-EBBA140D9C6E}" type="datetimeFigureOut">
               <a:rPr lang="en-US" smtClean="0"/>
-              <a:t>12/18/23</a:t>
+              <a:t>12/22/23</a:t>
             </a:fld>
             <a:endParaRPr lang="en-US"/>
           </a:p>
@@ -763,7 +763,7 @@
           <a:p>
             <a:fld id="{2650D653-7713-C643-991F-EBBA140D9C6E}" type="datetimeFigureOut">
               <a:rPr lang="en-US" smtClean="0"/>
-              <a:t>12/18/23</a:t>
+              <a:t>12/22/23</a:t>
             </a:fld>
             <a:endParaRPr lang="en-US"/>
           </a:p>
@@ -1007,7 +1007,7 @@
           <a:p>
             <a:fld id="{2650D653-7713-C643-991F-EBBA140D9C6E}" type="datetimeFigureOut">
               <a:rPr lang="en-US" smtClean="0"/>
-              <a:t>12/18/23</a:t>
+              <a:t>12/22/23</a:t>
             </a:fld>
             <a:endParaRPr lang="en-US"/>
           </a:p>
@@ -1239,7 +1239,7 @@
           <a:p>
             <a:fld id="{2650D653-7713-C643-991F-EBBA140D9C6E}" type="datetimeFigureOut">
               <a:rPr lang="en-US" smtClean="0"/>
-              <a:t>12/18/23</a:t>
+              <a:t>12/22/23</a:t>
             </a:fld>
             <a:endParaRPr lang="en-US"/>
           </a:p>
@@ -1606,7 +1606,7 @@
           <a:p>
             <a:fld id="{2650D653-7713-C643-991F-EBBA140D9C6E}" type="datetimeFigureOut">
               <a:rPr lang="en-US" smtClean="0"/>
-              <a:t>12/18/23</a:t>
+              <a:t>12/22/23</a:t>
             </a:fld>
             <a:endParaRPr lang="en-US"/>
           </a:p>
@@ -1724,7 +1724,7 @@
           <a:p>
             <a:fld id="{2650D653-7713-C643-991F-EBBA140D9C6E}" type="datetimeFigureOut">
               <a:rPr lang="en-US" smtClean="0"/>
-              <a:t>12/18/23</a:t>
+              <a:t>12/22/23</a:t>
             </a:fld>
             <a:endParaRPr lang="en-US"/>
           </a:p>
@@ -1819,7 +1819,7 @@
           <a:p>
             <a:fld id="{2650D653-7713-C643-991F-EBBA140D9C6E}" type="datetimeFigureOut">
               <a:rPr lang="en-US" smtClean="0"/>
-              <a:t>12/18/23</a:t>
+              <a:t>12/22/23</a:t>
             </a:fld>
             <a:endParaRPr lang="en-US"/>
           </a:p>
@@ -2096,7 +2096,7 @@
           <a:p>
             <a:fld id="{2650D653-7713-C643-991F-EBBA140D9C6E}" type="datetimeFigureOut">
               <a:rPr lang="en-US" smtClean="0"/>
-              <a:t>12/18/23</a:t>
+              <a:t>12/22/23</a:t>
             </a:fld>
             <a:endParaRPr lang="en-US"/>
           </a:p>
@@ -2353,7 +2353,7 @@
           <a:p>
             <a:fld id="{2650D653-7713-C643-991F-EBBA140D9C6E}" type="datetimeFigureOut">
               <a:rPr lang="en-US" smtClean="0"/>
-              <a:t>12/18/23</a:t>
+              <a:t>12/22/23</a:t>
             </a:fld>
             <a:endParaRPr lang="en-US"/>
           </a:p>
@@ -2566,7 +2566,7 @@
           <a:p>
             <a:fld id="{2650D653-7713-C643-991F-EBBA140D9C6E}" type="datetimeFigureOut">
               <a:rPr lang="en-US" smtClean="0"/>
-              <a:t>12/18/23</a:t>
+              <a:t>12/22/23</a:t>
             </a:fld>
             <a:endParaRPr lang="en-US"/>
           </a:p>

</xml_diff>

<commit_message>
update ReadMe's and finalize analysis following acceptance
</commit_message>
<xml_diff>
--- a/plots/Abundance_combined.pptx
+++ b/plots/Abundance_combined.pptx
@@ -243,7 +243,7 @@
           <a:p>
             <a:fld id="{2650D653-7713-C643-991F-EBBA140D9C6E}" type="datetimeFigureOut">
               <a:rPr lang="en-US" smtClean="0"/>
-              <a:t>12/22/23</a:t>
+              <a:t>12/27/23</a:t>
             </a:fld>
             <a:endParaRPr lang="en-US"/>
           </a:p>
@@ -413,7 +413,7 @@
           <a:p>
             <a:fld id="{2650D653-7713-C643-991F-EBBA140D9C6E}" type="datetimeFigureOut">
               <a:rPr lang="en-US" smtClean="0"/>
-              <a:t>12/22/23</a:t>
+              <a:t>12/27/23</a:t>
             </a:fld>
             <a:endParaRPr lang="en-US"/>
           </a:p>
@@ -593,7 +593,7 @@
           <a:p>
             <a:fld id="{2650D653-7713-C643-991F-EBBA140D9C6E}" type="datetimeFigureOut">
               <a:rPr lang="en-US" smtClean="0"/>
-              <a:t>12/22/23</a:t>
+              <a:t>12/27/23</a:t>
             </a:fld>
             <a:endParaRPr lang="en-US"/>
           </a:p>
@@ -763,7 +763,7 @@
           <a:p>
             <a:fld id="{2650D653-7713-C643-991F-EBBA140D9C6E}" type="datetimeFigureOut">
               <a:rPr lang="en-US" smtClean="0"/>
-              <a:t>12/22/23</a:t>
+              <a:t>12/27/23</a:t>
             </a:fld>
             <a:endParaRPr lang="en-US"/>
           </a:p>
@@ -1007,7 +1007,7 @@
           <a:p>
             <a:fld id="{2650D653-7713-C643-991F-EBBA140D9C6E}" type="datetimeFigureOut">
               <a:rPr lang="en-US" smtClean="0"/>
-              <a:t>12/22/23</a:t>
+              <a:t>12/27/23</a:t>
             </a:fld>
             <a:endParaRPr lang="en-US"/>
           </a:p>
@@ -1239,7 +1239,7 @@
           <a:p>
             <a:fld id="{2650D653-7713-C643-991F-EBBA140D9C6E}" type="datetimeFigureOut">
               <a:rPr lang="en-US" smtClean="0"/>
-              <a:t>12/22/23</a:t>
+              <a:t>12/27/23</a:t>
             </a:fld>
             <a:endParaRPr lang="en-US"/>
           </a:p>
@@ -1606,7 +1606,7 @@
           <a:p>
             <a:fld id="{2650D653-7713-C643-991F-EBBA140D9C6E}" type="datetimeFigureOut">
               <a:rPr lang="en-US" smtClean="0"/>
-              <a:t>12/22/23</a:t>
+              <a:t>12/27/23</a:t>
             </a:fld>
             <a:endParaRPr lang="en-US"/>
           </a:p>
@@ -1724,7 +1724,7 @@
           <a:p>
             <a:fld id="{2650D653-7713-C643-991F-EBBA140D9C6E}" type="datetimeFigureOut">
               <a:rPr lang="en-US" smtClean="0"/>
-              <a:t>12/22/23</a:t>
+              <a:t>12/27/23</a:t>
             </a:fld>
             <a:endParaRPr lang="en-US"/>
           </a:p>
@@ -1819,7 +1819,7 @@
           <a:p>
             <a:fld id="{2650D653-7713-C643-991F-EBBA140D9C6E}" type="datetimeFigureOut">
               <a:rPr lang="en-US" smtClean="0"/>
-              <a:t>12/22/23</a:t>
+              <a:t>12/27/23</a:t>
             </a:fld>
             <a:endParaRPr lang="en-US"/>
           </a:p>
@@ -2096,7 +2096,7 @@
           <a:p>
             <a:fld id="{2650D653-7713-C643-991F-EBBA140D9C6E}" type="datetimeFigureOut">
               <a:rPr lang="en-US" smtClean="0"/>
-              <a:t>12/22/23</a:t>
+              <a:t>12/27/23</a:t>
             </a:fld>
             <a:endParaRPr lang="en-US"/>
           </a:p>
@@ -2353,7 +2353,7 @@
           <a:p>
             <a:fld id="{2650D653-7713-C643-991F-EBBA140D9C6E}" type="datetimeFigureOut">
               <a:rPr lang="en-US" smtClean="0"/>
-              <a:t>12/22/23</a:t>
+              <a:t>12/27/23</a:t>
             </a:fld>
             <a:endParaRPr lang="en-US"/>
           </a:p>
@@ -2566,7 +2566,7 @@
           <a:p>
             <a:fld id="{2650D653-7713-C643-991F-EBBA140D9C6E}" type="datetimeFigureOut">
               <a:rPr lang="en-US" smtClean="0"/>
-              <a:t>12/22/23</a:t>
+              <a:t>12/27/23</a:t>
             </a:fld>
             <a:endParaRPr lang="en-US"/>
           </a:p>
@@ -3021,7 +3021,7 @@
         </p:blipFill>
         <p:spPr>
           <a:xfrm>
-            <a:off x="-115688" y="4330654"/>
+            <a:off x="-143606" y="4330655"/>
             <a:ext cx="5470209" cy="3646806"/>
           </a:xfrm>
           <a:prstGeom prst="rect">

</xml_diff>